<commit_message>
added presentation pdf + updated readme
</commit_message>
<xml_diff>
--- a/Documentation/Presentation.pptx
+++ b/Documentation/Presentation.pptx
@@ -16831,7 +16831,7 @@
           <a:blip r:embed="rId3">
             <a:extLst>
               <a:ext uri="{28A0092B-C50C-407E-A947-70E740481C1C}">
-                <a14:useLocalDpi xmlns:a14="http://schemas.microsoft.com/office/drawing/2010/main" val="0"/>
+                <a14:useLocalDpi xmlns:a14="http://schemas.microsoft.com/office/drawing/2010/main"/>
               </a:ext>
             </a:extLst>
           </a:blip>
@@ -17075,10 +17075,10 @@
           <p:nvPr/>
         </p:nvPicPr>
         <p:blipFill>
-          <a:blip r:embed="rId4">
+          <a:blip r:embed="rId4" cstate="print">
             <a:extLst>
               <a:ext uri="{28A0092B-C50C-407E-A947-70E740481C1C}">
-                <a14:useLocalDpi xmlns:a14="http://schemas.microsoft.com/office/drawing/2010/main" val="0"/>
+                <a14:useLocalDpi xmlns:a14="http://schemas.microsoft.com/office/drawing/2010/main"/>
               </a:ext>
             </a:extLst>
           </a:blip>
@@ -17135,60 +17135,6 @@
       </p:grpSpPr>
       <p:sp>
         <p:nvSpPr>
-          <p:cNvPr id="7" name="Shape 322"/>
-          <p:cNvSpPr/>
-          <p:nvPr/>
-        </p:nvSpPr>
-        <p:spPr>
-          <a:xfrm>
-            <a:off x="-1677" y="0"/>
-            <a:ext cx="6103714" cy="6858000"/>
-          </a:xfrm>
-          <a:prstGeom prst="rect">
-            <a:avLst/>
-          </a:prstGeom>
-          <a:solidFill>
-            <a:srgbClr val="AAE4D5"/>
-          </a:solidFill>
-          <a:ln w="12700" cap="flat" cmpd="sng">
-            <a:solidFill>
-              <a:srgbClr val="AAE4D5"/>
-            </a:solidFill>
-            <a:prstDash val="solid"/>
-            <a:miter lim="800000"/>
-            <a:headEnd type="none" w="sm" len="sm"/>
-            <a:tailEnd type="none" w="sm" len="sm"/>
-          </a:ln>
-        </p:spPr>
-        <p:txBody>
-          <a:bodyPr spcFirstLastPara="1" wrap="square" lIns="91425" tIns="45700" rIns="91425" bIns="45700" anchor="ctr" anchorCtr="0">
-            <a:noAutofit/>
-          </a:bodyPr>
-          <a:lstStyle/>
-          <a:p>
-            <a:pPr marL="0" marR="0" lvl="0" indent="0" algn="ctr" rtl="0">
-              <a:spcBef>
-                <a:spcPts val="0"/>
-              </a:spcBef>
-              <a:spcAft>
-                <a:spcPts val="0"/>
-              </a:spcAft>
-              <a:buNone/>
-            </a:pPr>
-            <a:endParaRPr sz="1800">
-              <a:solidFill>
-                <a:schemeClr val="lt1"/>
-              </a:solidFill>
-              <a:latin typeface="Playfair Display"/>
-              <a:ea typeface="Playfair Display"/>
-              <a:cs typeface="Playfair Display"/>
-              <a:sym typeface="Playfair Display"/>
-            </a:endParaRPr>
-          </a:p>
-        </p:txBody>
-      </p:sp>
-      <p:sp>
-        <p:nvSpPr>
           <p:cNvPr id="107" name="Shape 107"/>
           <p:cNvSpPr txBox="1"/>
           <p:nvPr/>
@@ -17251,7 +17197,7 @@
           <a:blip r:embed="rId3">
             <a:extLst>
               <a:ext uri="{28A0092B-C50C-407E-A947-70E740481C1C}">
-                <a14:useLocalDpi xmlns:a14="http://schemas.microsoft.com/office/drawing/2010/main" val="0"/>
+                <a14:useLocalDpi xmlns:a14="http://schemas.microsoft.com/office/drawing/2010/main"/>
               </a:ext>
             </a:extLst>
           </a:blip>
@@ -17289,10 +17235,10 @@
           <p:nvPr/>
         </p:nvPicPr>
         <p:blipFill>
-          <a:blip r:embed="rId4">
+          <a:blip r:embed="rId4" cstate="print">
             <a:extLst>
               <a:ext uri="{28A0092B-C50C-407E-A947-70E740481C1C}">
-                <a14:useLocalDpi xmlns:a14="http://schemas.microsoft.com/office/drawing/2010/main" val="0"/>
+                <a14:useLocalDpi xmlns:a14="http://schemas.microsoft.com/office/drawing/2010/main"/>
               </a:ext>
             </a:extLst>
           </a:blip>
@@ -17406,7 +17352,7 @@
           <a:blip r:embed="rId3">
             <a:extLst>
               <a:ext uri="{28A0092B-C50C-407E-A947-70E740481C1C}">
-                <a14:useLocalDpi xmlns:a14="http://schemas.microsoft.com/office/drawing/2010/main" val="0"/>
+                <a14:useLocalDpi xmlns:a14="http://schemas.microsoft.com/office/drawing/2010/main"/>
               </a:ext>
             </a:extLst>
           </a:blip>
@@ -17444,10 +17390,10 @@
           <p:nvPr/>
         </p:nvPicPr>
         <p:blipFill>
-          <a:blip r:embed="rId4">
+          <a:blip r:embed="rId4" cstate="print">
             <a:extLst>
               <a:ext uri="{28A0092B-C50C-407E-A947-70E740481C1C}">
-                <a14:useLocalDpi xmlns:a14="http://schemas.microsoft.com/office/drawing/2010/main" val="0"/>
+                <a14:useLocalDpi xmlns:a14="http://schemas.microsoft.com/office/drawing/2010/main"/>
               </a:ext>
             </a:extLst>
           </a:blip>
@@ -17793,7 +17739,7 @@
           <a:blip r:embed="rId3">
             <a:extLst>
               <a:ext uri="{28A0092B-C50C-407E-A947-70E740481C1C}">
-                <a14:useLocalDpi xmlns:a14="http://schemas.microsoft.com/office/drawing/2010/main" val="0"/>
+                <a14:useLocalDpi xmlns:a14="http://schemas.microsoft.com/office/drawing/2010/main"/>
               </a:ext>
             </a:extLst>
           </a:blip>
@@ -17831,10 +17777,10 @@
           <p:nvPr/>
         </p:nvPicPr>
         <p:blipFill>
-          <a:blip r:embed="rId4">
+          <a:blip r:embed="rId4" cstate="print">
             <a:extLst>
               <a:ext uri="{28A0092B-C50C-407E-A947-70E740481C1C}">
-                <a14:useLocalDpi xmlns:a14="http://schemas.microsoft.com/office/drawing/2010/main" val="0"/>
+                <a14:useLocalDpi xmlns:a14="http://schemas.microsoft.com/office/drawing/2010/main"/>
               </a:ext>
             </a:extLst>
           </a:blip>
@@ -18116,7 +18062,7 @@
           <a:blip r:embed="rId3">
             <a:extLst>
               <a:ext uri="{28A0092B-C50C-407E-A947-70E740481C1C}">
-                <a14:useLocalDpi xmlns:a14="http://schemas.microsoft.com/office/drawing/2010/main" val="0"/>
+                <a14:useLocalDpi xmlns:a14="http://schemas.microsoft.com/office/drawing/2010/main"/>
               </a:ext>
             </a:extLst>
           </a:blip>
@@ -18154,10 +18100,10 @@
           <p:nvPr/>
         </p:nvPicPr>
         <p:blipFill>
-          <a:blip r:embed="rId4">
+          <a:blip r:embed="rId4" cstate="print">
             <a:extLst>
               <a:ext uri="{28A0092B-C50C-407E-A947-70E740481C1C}">
-                <a14:useLocalDpi xmlns:a14="http://schemas.microsoft.com/office/drawing/2010/main" val="0"/>
+                <a14:useLocalDpi xmlns:a14="http://schemas.microsoft.com/office/drawing/2010/main"/>
               </a:ext>
             </a:extLst>
           </a:blip>
@@ -18346,7 +18292,7 @@
           <a:blip r:embed="rId3">
             <a:extLst>
               <a:ext uri="{28A0092B-C50C-407E-A947-70E740481C1C}">
-                <a14:useLocalDpi xmlns:a14="http://schemas.microsoft.com/office/drawing/2010/main" val="0"/>
+                <a14:useLocalDpi xmlns:a14="http://schemas.microsoft.com/office/drawing/2010/main"/>
               </a:ext>
             </a:extLst>
           </a:blip>
@@ -18384,10 +18330,10 @@
           <p:nvPr/>
         </p:nvPicPr>
         <p:blipFill>
-          <a:blip r:embed="rId4">
+          <a:blip r:embed="rId4" cstate="print">
             <a:extLst>
               <a:ext uri="{28A0092B-C50C-407E-A947-70E740481C1C}">
-                <a14:useLocalDpi xmlns:a14="http://schemas.microsoft.com/office/drawing/2010/main" val="0"/>
+                <a14:useLocalDpi xmlns:a14="http://schemas.microsoft.com/office/drawing/2010/main"/>
               </a:ext>
             </a:extLst>
           </a:blip>
@@ -18441,7 +18387,7 @@
           <a:blip r:embed="rId5">
             <a:extLst>
               <a:ext uri="{28A0092B-C50C-407E-A947-70E740481C1C}">
-                <a14:useLocalDpi xmlns:a14="http://schemas.microsoft.com/office/drawing/2010/main" val="0"/>
+                <a14:useLocalDpi xmlns:a14="http://schemas.microsoft.com/office/drawing/2010/main"/>
               </a:ext>
             </a:extLst>
           </a:blip>
@@ -18505,10 +18451,10 @@
           <p:nvPr/>
         </p:nvPicPr>
         <p:blipFill rotWithShape="1">
-          <a:blip r:embed="rId3">
+          <a:blip r:embed="rId3" cstate="print">
             <a:extLst>
               <a:ext uri="{28A0092B-C50C-407E-A947-70E740481C1C}">
-                <a14:useLocalDpi xmlns:a14="http://schemas.microsoft.com/office/drawing/2010/main" val="0"/>
+                <a14:useLocalDpi xmlns:a14="http://schemas.microsoft.com/office/drawing/2010/main"/>
               </a:ext>
             </a:extLst>
           </a:blip>
@@ -18605,7 +18551,7 @@
           <a:blip r:embed="rId4">
             <a:extLst>
               <a:ext uri="{28A0092B-C50C-407E-A947-70E740481C1C}">
-                <a14:useLocalDpi xmlns:a14="http://schemas.microsoft.com/office/drawing/2010/main" val="0"/>
+                <a14:useLocalDpi xmlns:a14="http://schemas.microsoft.com/office/drawing/2010/main"/>
               </a:ext>
             </a:extLst>
           </a:blip>
@@ -18643,10 +18589,10 @@
           <p:nvPr/>
         </p:nvPicPr>
         <p:blipFill>
-          <a:blip r:embed="rId5">
+          <a:blip r:embed="rId5" cstate="print">
             <a:extLst>
               <a:ext uri="{28A0092B-C50C-407E-A947-70E740481C1C}">
-                <a14:useLocalDpi xmlns:a14="http://schemas.microsoft.com/office/drawing/2010/main" val="0"/>
+                <a14:useLocalDpi xmlns:a14="http://schemas.microsoft.com/office/drawing/2010/main"/>
               </a:ext>
             </a:extLst>
           </a:blip>
@@ -18795,14 +18741,14 @@
           <p:nvPr/>
         </p:nvPicPr>
         <p:blipFill rotWithShape="1">
-          <a:blip r:embed="rId6">
+          <a:blip r:embed="rId6" cstate="print">
             <a:extLst>
               <a:ext uri="{28A0092B-C50C-407E-A947-70E740481C1C}">
-                <a14:useLocalDpi xmlns:a14="http://schemas.microsoft.com/office/drawing/2010/main" val="0"/>
+                <a14:useLocalDpi xmlns:a14="http://schemas.microsoft.com/office/drawing/2010/main"/>
               </a:ext>
             </a:extLst>
           </a:blip>
-          <a:srcRect l="29630" t="23604" r="31648" b="8062"/>
+          <a:srcRect/>
           <a:stretch/>
         </p:blipFill>
         <p:spPr>
@@ -18934,10 +18880,10 @@
           <p:nvPr/>
         </p:nvPicPr>
         <p:blipFill>
-          <a:blip r:embed="rId7">
+          <a:blip r:embed="rId7" cstate="print">
             <a:extLst>
               <a:ext uri="{28A0092B-C50C-407E-A947-70E740481C1C}">
-                <a14:useLocalDpi xmlns:a14="http://schemas.microsoft.com/office/drawing/2010/main" val="0"/>
+                <a14:useLocalDpi xmlns:a14="http://schemas.microsoft.com/office/drawing/2010/main"/>
               </a:ext>
             </a:extLst>
           </a:blip>
@@ -19149,7 +19095,7 @@
           <a:blip r:embed="rId8">
             <a:extLst>
               <a:ext uri="{28A0092B-C50C-407E-A947-70E740481C1C}">
-                <a14:useLocalDpi xmlns:a14="http://schemas.microsoft.com/office/drawing/2010/main" val="0"/>
+                <a14:useLocalDpi xmlns:a14="http://schemas.microsoft.com/office/drawing/2010/main"/>
               </a:ext>
             </a:extLst>
           </a:blip>
@@ -19176,14 +19122,14 @@
           <p:nvPr/>
         </p:nvPicPr>
         <p:blipFill rotWithShape="1">
-          <a:blip r:embed="rId9">
+          <a:blip r:embed="rId9" cstate="print">
             <a:extLst>
               <a:ext uri="{28A0092B-C50C-407E-A947-70E740481C1C}">
-                <a14:useLocalDpi xmlns:a14="http://schemas.microsoft.com/office/drawing/2010/main" val="0"/>
+                <a14:useLocalDpi xmlns:a14="http://schemas.microsoft.com/office/drawing/2010/main"/>
               </a:ext>
             </a:extLst>
           </a:blip>
-          <a:srcRect l="9234" t="3362" r="11299" b="3106"/>
+          <a:srcRect/>
           <a:stretch/>
         </p:blipFill>
         <p:spPr>
@@ -19205,14 +19151,14 @@
           <p:nvPr/>
         </p:nvPicPr>
         <p:blipFill rotWithShape="1">
-          <a:blip r:embed="rId10">
+          <a:blip r:embed="rId10" cstate="print">
             <a:extLst>
               <a:ext uri="{28A0092B-C50C-407E-A947-70E740481C1C}">
-                <a14:useLocalDpi xmlns:a14="http://schemas.microsoft.com/office/drawing/2010/main" val="0"/>
+                <a14:useLocalDpi xmlns:a14="http://schemas.microsoft.com/office/drawing/2010/main"/>
               </a:ext>
             </a:extLst>
           </a:blip>
-          <a:srcRect l="5009" t="11292" r="6162" b="8416"/>
+          <a:srcRect/>
           <a:stretch/>
         </p:blipFill>
         <p:spPr>
@@ -19876,10 +19822,10 @@
           <p:nvPr/>
         </p:nvPicPr>
         <p:blipFill rotWithShape="1">
-          <a:blip r:embed="rId3">
+          <a:blip r:embed="rId3" cstate="print">
             <a:extLst>
               <a:ext uri="{28A0092B-C50C-407E-A947-70E740481C1C}">
-                <a14:useLocalDpi xmlns:a14="http://schemas.microsoft.com/office/drawing/2010/main" val="0"/>
+                <a14:useLocalDpi xmlns:a14="http://schemas.microsoft.com/office/drawing/2010/main"/>
               </a:ext>
             </a:extLst>
           </a:blip>
@@ -19976,7 +19922,7 @@
           <a:blip r:embed="rId4">
             <a:extLst>
               <a:ext uri="{28A0092B-C50C-407E-A947-70E740481C1C}">
-                <a14:useLocalDpi xmlns:a14="http://schemas.microsoft.com/office/drawing/2010/main" val="0"/>
+                <a14:useLocalDpi xmlns:a14="http://schemas.microsoft.com/office/drawing/2010/main"/>
               </a:ext>
             </a:extLst>
           </a:blip>
@@ -20014,10 +19960,10 @@
           <p:nvPr/>
         </p:nvPicPr>
         <p:blipFill>
-          <a:blip r:embed="rId5">
+          <a:blip r:embed="rId5" cstate="print">
             <a:extLst>
               <a:ext uri="{28A0092B-C50C-407E-A947-70E740481C1C}">
-                <a14:useLocalDpi xmlns:a14="http://schemas.microsoft.com/office/drawing/2010/main" val="0"/>
+                <a14:useLocalDpi xmlns:a14="http://schemas.microsoft.com/office/drawing/2010/main"/>
               </a:ext>
             </a:extLst>
           </a:blip>
@@ -20154,10 +20100,10 @@
           <p:nvPr/>
         </p:nvPicPr>
         <p:blipFill rotWithShape="1">
-          <a:blip r:embed="rId6">
+          <a:blip r:embed="rId6" cstate="print">
             <a:extLst>
               <a:ext uri="{28A0092B-C50C-407E-A947-70E740481C1C}">
-                <a14:useLocalDpi xmlns:a14="http://schemas.microsoft.com/office/drawing/2010/main" val="0"/>
+                <a14:useLocalDpi xmlns:a14="http://schemas.microsoft.com/office/drawing/2010/main"/>
               </a:ext>
             </a:extLst>
           </a:blip>
@@ -20389,14 +20335,14 @@
           <p:nvPr/>
         </p:nvPicPr>
         <p:blipFill rotWithShape="1">
-          <a:blip r:embed="rId7">
+          <a:blip r:embed="rId7" cstate="print">
             <a:extLst>
               <a:ext uri="{28A0092B-C50C-407E-A947-70E740481C1C}">
-                <a14:useLocalDpi xmlns:a14="http://schemas.microsoft.com/office/drawing/2010/main" val="0"/>
+                <a14:useLocalDpi xmlns:a14="http://schemas.microsoft.com/office/drawing/2010/main"/>
               </a:ext>
             </a:extLst>
           </a:blip>
-          <a:srcRect l="3108" t="11803" r="3742" b="10732"/>
+          <a:srcRect/>
           <a:stretch/>
         </p:blipFill>
         <p:spPr>
@@ -20418,14 +20364,14 @@
           <p:nvPr/>
         </p:nvPicPr>
         <p:blipFill rotWithShape="1">
-          <a:blip r:embed="rId8">
+          <a:blip r:embed="rId8" cstate="print">
             <a:extLst>
               <a:ext uri="{28A0092B-C50C-407E-A947-70E740481C1C}">
-                <a14:useLocalDpi xmlns:a14="http://schemas.microsoft.com/office/drawing/2010/main" val="0"/>
+                <a14:useLocalDpi xmlns:a14="http://schemas.microsoft.com/office/drawing/2010/main"/>
               </a:ext>
             </a:extLst>
           </a:blip>
-          <a:srcRect l="7491" t="4234" r="10924" b="3885"/>
+          <a:srcRect/>
           <a:stretch/>
         </p:blipFill>
         <p:spPr>
@@ -21111,7 +21057,7 @@
           <a:blip r:embed="rId3">
             <a:extLst>
               <a:ext uri="{28A0092B-C50C-407E-A947-70E740481C1C}">
-                <a14:useLocalDpi xmlns:a14="http://schemas.microsoft.com/office/drawing/2010/main" val="0"/>
+                <a14:useLocalDpi xmlns:a14="http://schemas.microsoft.com/office/drawing/2010/main"/>
               </a:ext>
             </a:extLst>
           </a:blip>
@@ -21149,10 +21095,10 @@
           <p:nvPr/>
         </p:nvPicPr>
         <p:blipFill>
-          <a:blip r:embed="rId4">
+          <a:blip r:embed="rId4" cstate="print">
             <a:extLst>
               <a:ext uri="{28A0092B-C50C-407E-A947-70E740481C1C}">
-                <a14:useLocalDpi xmlns:a14="http://schemas.microsoft.com/office/drawing/2010/main" val="0"/>
+                <a14:useLocalDpi xmlns:a14="http://schemas.microsoft.com/office/drawing/2010/main"/>
               </a:ext>
             </a:extLst>
           </a:blip>
@@ -21483,7 +21429,7 @@
           <a:blip r:embed="rId3">
             <a:extLst>
               <a:ext uri="{28A0092B-C50C-407E-A947-70E740481C1C}">
-                <a14:useLocalDpi xmlns:a14="http://schemas.microsoft.com/office/drawing/2010/main" val="0"/>
+                <a14:useLocalDpi xmlns:a14="http://schemas.microsoft.com/office/drawing/2010/main"/>
               </a:ext>
             </a:extLst>
           </a:blip>
@@ -21521,10 +21467,10 @@
           <p:nvPr/>
         </p:nvPicPr>
         <p:blipFill>
-          <a:blip r:embed="rId4">
+          <a:blip r:embed="rId4" cstate="print">
             <a:extLst>
               <a:ext uri="{28A0092B-C50C-407E-A947-70E740481C1C}">
-                <a14:useLocalDpi xmlns:a14="http://schemas.microsoft.com/office/drawing/2010/main" val="0"/>
+                <a14:useLocalDpi xmlns:a14="http://schemas.microsoft.com/office/drawing/2010/main"/>
               </a:ext>
             </a:extLst>
           </a:blip>
@@ -21637,6 +21583,14 @@
 <file path=ppt/slides/slide9.xml><?xml version="1.0" encoding="utf-8"?>
 <p:sld xmlns:a="http://schemas.openxmlformats.org/drawingml/2006/main" xmlns:r="http://schemas.openxmlformats.org/officeDocument/2006/relationships" xmlns:p="http://schemas.openxmlformats.org/presentationml/2006/main">
   <p:cSld>
+    <p:bg>
+      <p:bgPr>
+        <a:solidFill>
+          <a:srgbClr val="AAE4D5"/>
+        </a:solidFill>
+        <a:effectLst/>
+      </p:bgPr>
+    </p:bg>
     <p:spTree>
       <p:nvGrpSpPr>
         <p:cNvPr id="1" name="Shape 102"/>
@@ -21651,114 +21605,6 @@
           <a:chExt cx="0" cy="0"/>
         </a:xfrm>
       </p:grpSpPr>
-      <p:sp>
-        <p:nvSpPr>
-          <p:cNvPr id="6" name="Shape 322"/>
-          <p:cNvSpPr/>
-          <p:nvPr/>
-        </p:nvSpPr>
-        <p:spPr>
-          <a:xfrm>
-            <a:off x="6074795" y="0"/>
-            <a:ext cx="6103714" cy="6858000"/>
-          </a:xfrm>
-          <a:prstGeom prst="rect">
-            <a:avLst/>
-          </a:prstGeom>
-          <a:solidFill>
-            <a:srgbClr val="AAE4D5"/>
-          </a:solidFill>
-          <a:ln w="12700" cap="flat" cmpd="sng">
-            <a:solidFill>
-              <a:srgbClr val="AAE4D5"/>
-            </a:solidFill>
-            <a:prstDash val="solid"/>
-            <a:miter lim="800000"/>
-            <a:headEnd type="none" w="sm" len="sm"/>
-            <a:tailEnd type="none" w="sm" len="sm"/>
-          </a:ln>
-        </p:spPr>
-        <p:txBody>
-          <a:bodyPr spcFirstLastPara="1" wrap="square" lIns="91425" tIns="45700" rIns="91425" bIns="45700" anchor="ctr" anchorCtr="0">
-            <a:noAutofit/>
-          </a:bodyPr>
-          <a:lstStyle/>
-          <a:p>
-            <a:pPr marL="0" marR="0" lvl="0" indent="0" algn="ctr" rtl="0">
-              <a:spcBef>
-                <a:spcPts val="0"/>
-              </a:spcBef>
-              <a:spcAft>
-                <a:spcPts val="0"/>
-              </a:spcAft>
-              <a:buNone/>
-            </a:pPr>
-            <a:endParaRPr sz="1800">
-              <a:solidFill>
-                <a:schemeClr val="lt1"/>
-              </a:solidFill>
-              <a:latin typeface="Playfair Display"/>
-              <a:ea typeface="Playfair Display"/>
-              <a:cs typeface="Playfair Display"/>
-              <a:sym typeface="Playfair Display"/>
-            </a:endParaRPr>
-          </a:p>
-        </p:txBody>
-      </p:sp>
-      <p:sp>
-        <p:nvSpPr>
-          <p:cNvPr id="7" name="Shape 322"/>
-          <p:cNvSpPr/>
-          <p:nvPr/>
-        </p:nvSpPr>
-        <p:spPr>
-          <a:xfrm>
-            <a:off x="-1677" y="0"/>
-            <a:ext cx="6103714" cy="6858000"/>
-          </a:xfrm>
-          <a:prstGeom prst="rect">
-            <a:avLst/>
-          </a:prstGeom>
-          <a:solidFill>
-            <a:srgbClr val="AAE4D5"/>
-          </a:solidFill>
-          <a:ln w="12700" cap="flat" cmpd="sng">
-            <a:solidFill>
-              <a:srgbClr val="AAE4D5"/>
-            </a:solidFill>
-            <a:prstDash val="solid"/>
-            <a:miter lim="800000"/>
-            <a:headEnd type="none" w="sm" len="sm"/>
-            <a:tailEnd type="none" w="sm" len="sm"/>
-          </a:ln>
-        </p:spPr>
-        <p:txBody>
-          <a:bodyPr spcFirstLastPara="1" wrap="square" lIns="91425" tIns="45700" rIns="91425" bIns="45700" anchor="ctr" anchorCtr="0">
-            <a:noAutofit/>
-          </a:bodyPr>
-          <a:lstStyle/>
-          <a:p>
-            <a:pPr marL="0" marR="0" lvl="0" indent="0" algn="ctr" rtl="0">
-              <a:spcBef>
-                <a:spcPts val="0"/>
-              </a:spcBef>
-              <a:spcAft>
-                <a:spcPts val="0"/>
-              </a:spcAft>
-              <a:buNone/>
-            </a:pPr>
-            <a:endParaRPr sz="1800">
-              <a:solidFill>
-                <a:schemeClr val="lt1"/>
-              </a:solidFill>
-              <a:latin typeface="Playfair Display"/>
-              <a:ea typeface="Playfair Display"/>
-              <a:cs typeface="Playfair Display"/>
-              <a:sym typeface="Playfair Display"/>
-            </a:endParaRPr>
-          </a:p>
-        </p:txBody>
-      </p:sp>
       <p:sp>
         <p:nvSpPr>
           <p:cNvPr id="107" name="Shape 107"/>
@@ -21823,7 +21669,7 @@
           <a:blip r:embed="rId3">
             <a:extLst>
               <a:ext uri="{28A0092B-C50C-407E-A947-70E740481C1C}">
-                <a14:useLocalDpi xmlns:a14="http://schemas.microsoft.com/office/drawing/2010/main" val="0"/>
+                <a14:useLocalDpi xmlns:a14="http://schemas.microsoft.com/office/drawing/2010/main"/>
               </a:ext>
             </a:extLst>
           </a:blip>
@@ -21861,10 +21707,10 @@
           <p:nvPr/>
         </p:nvPicPr>
         <p:blipFill>
-          <a:blip r:embed="rId4">
+          <a:blip r:embed="rId4" cstate="print">
             <a:extLst>
               <a:ext uri="{28A0092B-C50C-407E-A947-70E740481C1C}">
-                <a14:useLocalDpi xmlns:a14="http://schemas.microsoft.com/office/drawing/2010/main" val="0"/>
+                <a14:useLocalDpi xmlns:a14="http://schemas.microsoft.com/office/drawing/2010/main"/>
               </a:ext>
             </a:extLst>
           </a:blip>

</xml_diff>

<commit_message>
update doc + presentation
</commit_message>
<xml_diff>
--- a/Documentation/Presentation.pptx
+++ b/Documentation/Presentation.pptx
@@ -28,28 +28,28 @@
   <p:notesSz cx="6858000" cy="9144000"/>
   <p:embeddedFontLst>
     <p:embeddedFont>
-      <p:font typeface="Playfair Display" panose="020B0604020202020204" charset="0"/>
+      <p:font typeface="Calibri" panose="020F0502020204030204" pitchFamily="34" charset="0"/>
       <p:regular r:id="rId18"/>
       <p:bold r:id="rId19"/>
       <p:italic r:id="rId20"/>
       <p:boldItalic r:id="rId21"/>
     </p:embeddedFont>
     <p:embeddedFont>
-      <p:font typeface="Calibri" panose="020F0502020204030204" pitchFamily="34" charset="0"/>
+      <p:font typeface="Montserrat" panose="020B0604020202020204" charset="0"/>
       <p:regular r:id="rId22"/>
       <p:bold r:id="rId23"/>
       <p:italic r:id="rId24"/>
       <p:boldItalic r:id="rId25"/>
     </p:embeddedFont>
     <p:embeddedFont>
-      <p:font typeface="Montserrat" panose="020B0604020202020204" charset="0"/>
+      <p:font typeface="Lato Light" panose="020B0604020202020204" charset="0"/>
       <p:regular r:id="rId26"/>
       <p:bold r:id="rId27"/>
       <p:italic r:id="rId28"/>
       <p:boldItalic r:id="rId29"/>
     </p:embeddedFont>
     <p:embeddedFont>
-      <p:font typeface="Lato Light" panose="020B0604020202020204" charset="0"/>
+      <p:font typeface="Playfair Display" panose="020B0604020202020204" charset="0"/>
       <p:regular r:id="rId30"/>
       <p:bold r:id="rId31"/>
       <p:italic r:id="rId32"/>
@@ -19007,7 +19007,18 @@
                 <a:cs typeface="Times New Roman" panose="02020603050405020304" pitchFamily="18" charset="0"/>
                 <a:sym typeface="Lato Light"/>
               </a:rPr>
-              <a:t>Creșterea numărului de dispo</a:t>
+              <a:t>Creșterea numărului de </a:t>
+            </a:r>
+            <a:r>
+              <a:rPr lang="ro-RO" sz="3200" dirty="0" smtClean="0">
+                <a:solidFill>
+                  <a:schemeClr val="tx1"/>
+                </a:solidFill>
+                <a:latin typeface="Times New Roman" panose="02020603050405020304" pitchFamily="18" charset="0"/>
+                <a:cs typeface="Times New Roman" panose="02020603050405020304" pitchFamily="18" charset="0"/>
+                <a:sym typeface="Lato Light"/>
+              </a:rPr>
+              <a:t>dispo</a:t>
             </a:r>
             <a:r>
               <a:rPr lang="en-US" sz="3200" dirty="0" smtClean="0">
@@ -19032,7 +19043,7 @@
               <a:t>itive</a:t>
             </a:r>
             <a:r>
-              <a:rPr lang="en-US" sz="3200" dirty="0" smtClean="0">
+              <a:rPr lang="en-US" sz="3200" dirty="0">
                 <a:solidFill>
                   <a:schemeClr val="tx1"/>
                 </a:solidFill>
@@ -19040,7 +19051,7 @@
                 <a:cs typeface="Times New Roman" panose="02020603050405020304" pitchFamily="18" charset="0"/>
                 <a:sym typeface="Lato Light"/>
               </a:rPr>
-              <a:t>;</a:t>
+              <a:t>.</a:t>
             </a:r>
             <a:endParaRPr lang="ro-RO" sz="3200" dirty="0" smtClean="0">
               <a:solidFill>
@@ -19138,7 +19149,7 @@
               <a:t>utilizatori</a:t>
             </a:r>
             <a:r>
-              <a:rPr lang="en-US" sz="3200" dirty="0" smtClean="0">
+              <a:rPr lang="en-US" sz="3200" dirty="0">
                 <a:solidFill>
                   <a:schemeClr val="tx1"/>
                 </a:solidFill>
@@ -19146,7 +19157,7 @@
                 <a:cs typeface="Times New Roman" panose="02020603050405020304" pitchFamily="18" charset="0"/>
                 <a:sym typeface="Lato Light"/>
               </a:rPr>
-              <a:t>;</a:t>
+              <a:t>.</a:t>
             </a:r>
             <a:endParaRPr lang="ro-RO" sz="3200" dirty="0" smtClean="0">
               <a:solidFill>
@@ -19199,14 +19210,6 @@
               </a:rPr>
               <a:t>Folosire HTTPS.</a:t>
             </a:r>
-            <a:endParaRPr lang="ro-RO" sz="3200" dirty="0" smtClean="0">
-              <a:solidFill>
-                <a:schemeClr val="tx1"/>
-              </a:solidFill>
-              <a:latin typeface="Times New Roman" panose="02020603050405020304" pitchFamily="18" charset="0"/>
-              <a:cs typeface="Times New Roman" panose="02020603050405020304" pitchFamily="18" charset="0"/>
-              <a:sym typeface="Lato Light"/>
-            </a:endParaRPr>
           </a:p>
         </p:txBody>
       </p:sp>
@@ -19820,14 +19823,6 @@
               </a:rPr>
               <a:t>Experiență cu o gamă largă de tehnologii.</a:t>
             </a:r>
-            <a:endParaRPr lang="ro-RO" sz="3200" dirty="0" smtClean="0">
-              <a:solidFill>
-                <a:schemeClr val="tx1"/>
-              </a:solidFill>
-              <a:latin typeface="Times New Roman" panose="02020603050405020304" pitchFamily="18" charset="0"/>
-              <a:cs typeface="Times New Roman" panose="02020603050405020304" pitchFamily="18" charset="0"/>
-              <a:sym typeface="Lato Light"/>
-            </a:endParaRPr>
           </a:p>
         </p:txBody>
       </p:sp>
@@ -20276,19 +20271,7 @@
                 <a:cs typeface="Times New Roman" panose="02020603050405020304" pitchFamily="18" charset="0"/>
                 <a:sym typeface="Lato Light"/>
               </a:rPr>
-              <a:t>1</a:t>
-            </a:r>
-            <a:r>
-              <a:rPr lang="ro-RO" sz="3200" dirty="0" smtClean="0">
-                <a:solidFill>
-                  <a:schemeClr val="tx1"/>
-                </a:solidFill>
-                <a:latin typeface="Times New Roman" panose="02020603050405020304" pitchFamily="18" charset="0"/>
-                <a:ea typeface="Lato Light"/>
-                <a:cs typeface="Times New Roman" panose="02020603050405020304" pitchFamily="18" charset="0"/>
-                <a:sym typeface="Lato Light"/>
-              </a:rPr>
-              <a:t>.</a:t>
+              <a:t>1.</a:t>
             </a:r>
             <a:r>
               <a:rPr lang="en-US" sz="3200" dirty="0" smtClean="0">
@@ -20312,19 +20295,7 @@
                 <a:cs typeface="Times New Roman" panose="02020603050405020304" pitchFamily="18" charset="0"/>
                 <a:sym typeface="Lato Light"/>
               </a:rPr>
-              <a:t>ție</a:t>
-            </a:r>
-            <a:r>
-              <a:rPr lang="ro-RO" sz="3200" dirty="0" smtClean="0">
-                <a:solidFill>
-                  <a:schemeClr val="tx1"/>
-                </a:solidFill>
-                <a:latin typeface="Times New Roman" panose="02020603050405020304" pitchFamily="18" charset="0"/>
-                <a:ea typeface="Lato Light"/>
-                <a:cs typeface="Times New Roman" panose="02020603050405020304" pitchFamily="18" charset="0"/>
-                <a:sym typeface="Lato Light"/>
-              </a:rPr>
-              <a:t> </a:t>
+              <a:t>ție </a:t>
             </a:r>
             <a:endParaRPr lang="en-US" sz="3200" dirty="0" smtClean="0">
               <a:solidFill>
@@ -20399,18 +20370,7 @@
                 <a:cs typeface="Times New Roman" panose="02020603050405020304" pitchFamily="18" charset="0"/>
                 <a:sym typeface="Lato Light"/>
               </a:rPr>
-              <a:t> </a:t>
-            </a:r>
-            <a:r>
-              <a:rPr lang="ro-RO" sz="3200" dirty="0" smtClean="0">
-                <a:solidFill>
-                  <a:schemeClr val="tx1"/>
-                </a:solidFill>
-                <a:latin typeface="Times New Roman" panose="02020603050405020304" pitchFamily="18" charset="0"/>
-                <a:cs typeface="Times New Roman" panose="02020603050405020304" pitchFamily="18" charset="0"/>
-                <a:sym typeface="Lato Light"/>
-              </a:rPr>
-              <a:t>Arhitectura sistemului</a:t>
+              <a:t> Arhitectura sistemului</a:t>
             </a:r>
             <a:endParaRPr lang="en-US" sz="3200" dirty="0" smtClean="0">
               <a:solidFill>
@@ -20504,18 +20464,7 @@
                 <a:cs typeface="Times New Roman" panose="02020603050405020304" pitchFamily="18" charset="0"/>
                 <a:sym typeface="Lato Light"/>
               </a:rPr>
-              <a:t>. </a:t>
-            </a:r>
-            <a:r>
-              <a:rPr lang="ro-RO" sz="3200" dirty="0" smtClean="0">
-                <a:solidFill>
-                  <a:schemeClr val="tx1"/>
-                </a:solidFill>
-                <a:latin typeface="Times New Roman" panose="02020603050405020304" pitchFamily="18" charset="0"/>
-                <a:cs typeface="Times New Roman" panose="02020603050405020304" pitchFamily="18" charset="0"/>
-                <a:sym typeface="Lato Light"/>
-              </a:rPr>
-              <a:t>Server REST Java</a:t>
+              <a:t>. Server REST Java</a:t>
             </a:r>
           </a:p>
           <a:p>
@@ -20547,18 +20496,7 @@
                 <a:cs typeface="Times New Roman" panose="02020603050405020304" pitchFamily="18" charset="0"/>
                 <a:sym typeface="Lato Light"/>
               </a:rPr>
-              <a:t>. </a:t>
-            </a:r>
-            <a:r>
-              <a:rPr lang="ro-RO" sz="3200" dirty="0" smtClean="0">
-                <a:solidFill>
-                  <a:schemeClr val="tx1"/>
-                </a:solidFill>
-                <a:latin typeface="Times New Roman" panose="02020603050405020304" pitchFamily="18" charset="0"/>
-                <a:cs typeface="Times New Roman" panose="02020603050405020304" pitchFamily="18" charset="0"/>
-                <a:sym typeface="Lato Light"/>
-              </a:rPr>
-              <a:t>Dispozitive inteligente</a:t>
+              <a:t>. Dispozitive inteligente</a:t>
             </a:r>
           </a:p>
           <a:p>
@@ -20590,38 +20528,8 @@
                 <a:cs typeface="Times New Roman" panose="02020603050405020304" pitchFamily="18" charset="0"/>
                 <a:sym typeface="Lato Light"/>
               </a:rPr>
-              <a:t>. </a:t>
+              <a:t>. Dispozitive utilizate</a:t>
             </a:r>
-            <a:r>
-              <a:rPr lang="ro-RO" sz="3200" dirty="0" smtClean="0">
-                <a:solidFill>
-                  <a:schemeClr val="tx1"/>
-                </a:solidFill>
-                <a:latin typeface="Times New Roman" panose="02020603050405020304" pitchFamily="18" charset="0"/>
-                <a:cs typeface="Times New Roman" panose="02020603050405020304" pitchFamily="18" charset="0"/>
-                <a:sym typeface="Lato Light"/>
-              </a:rPr>
-              <a:t>Dispozitive </a:t>
-            </a:r>
-            <a:r>
-              <a:rPr lang="ro-RO" sz="3200" dirty="0" smtClean="0">
-                <a:solidFill>
-                  <a:schemeClr val="tx1"/>
-                </a:solidFill>
-                <a:latin typeface="Times New Roman" panose="02020603050405020304" pitchFamily="18" charset="0"/>
-                <a:cs typeface="Times New Roman" panose="02020603050405020304" pitchFamily="18" charset="0"/>
-                <a:sym typeface="Lato Light"/>
-              </a:rPr>
-              <a:t>utilizate</a:t>
-            </a:r>
-            <a:endParaRPr lang="ro-RO" sz="3200" dirty="0" smtClean="0">
-              <a:solidFill>
-                <a:schemeClr val="tx1"/>
-              </a:solidFill>
-              <a:latin typeface="Times New Roman" panose="02020603050405020304" pitchFamily="18" charset="0"/>
-              <a:cs typeface="Times New Roman" panose="02020603050405020304" pitchFamily="18" charset="0"/>
-              <a:sym typeface="Lato Light"/>
-            </a:endParaRPr>
           </a:p>
           <a:p>
             <a:pPr marR="0" lvl="0" algn="l" rtl="0">
@@ -20652,18 +20560,7 @@
                 <a:cs typeface="Times New Roman" panose="02020603050405020304" pitchFamily="18" charset="0"/>
                 <a:sym typeface="Lato Light"/>
               </a:rPr>
-              <a:t>. </a:t>
-            </a:r>
-            <a:r>
-              <a:rPr lang="ro-RO" sz="3200" dirty="0" smtClean="0">
-                <a:solidFill>
-                  <a:schemeClr val="tx1"/>
-                </a:solidFill>
-                <a:latin typeface="Times New Roman" panose="02020603050405020304" pitchFamily="18" charset="0"/>
-                <a:cs typeface="Times New Roman" panose="02020603050405020304" pitchFamily="18" charset="0"/>
-                <a:sym typeface="Lato Light"/>
-              </a:rPr>
-              <a:t>Direcții de dezvoltare</a:t>
+              <a:t>. Direcții de dezvoltare</a:t>
             </a:r>
           </a:p>
           <a:p>
@@ -20695,18 +20592,7 @@
                 <a:cs typeface="Times New Roman" panose="02020603050405020304" pitchFamily="18" charset="0"/>
                 <a:sym typeface="Lato Light"/>
               </a:rPr>
-              <a:t>. </a:t>
-            </a:r>
-            <a:r>
-              <a:rPr lang="ro-RO" sz="3200" dirty="0" smtClean="0">
-                <a:solidFill>
-                  <a:schemeClr val="tx1"/>
-                </a:solidFill>
-                <a:latin typeface="Times New Roman" panose="02020603050405020304" pitchFamily="18" charset="0"/>
-                <a:cs typeface="Times New Roman" panose="02020603050405020304" pitchFamily="18" charset="0"/>
-                <a:sym typeface="Lato Light"/>
-              </a:rPr>
-              <a:t>Concluzii</a:t>
+              <a:t>. Concluzii</a:t>
             </a:r>
           </a:p>
           <a:p>
@@ -21179,18 +21065,7 @@
                 <a:cs typeface="Times New Roman" panose="02020603050405020304" pitchFamily="18" charset="0"/>
                 <a:sym typeface="Lato Light"/>
               </a:rPr>
-              <a:t>L</a:t>
-            </a:r>
-            <a:r>
-              <a:rPr lang="ro-RO" sz="2400" dirty="0" smtClean="0">
-                <a:solidFill>
-                  <a:schemeClr val="tx1"/>
-                </a:solidFill>
-                <a:latin typeface="Times New Roman" panose="02020603050405020304" pitchFamily="18" charset="0"/>
-                <a:cs typeface="Times New Roman" panose="02020603050405020304" pitchFamily="18" charset="0"/>
-                <a:sym typeface="Lato Light"/>
-              </a:rPr>
-              <a:t>iteratura științifico-fantastică - </a:t>
+              <a:t>Literatura științifico-fantastică - </a:t>
             </a:r>
             <a:r>
               <a:rPr lang="en-US" sz="2400" dirty="0" smtClean="0">
@@ -21236,14 +21111,6 @@
               </a:rPr>
               <a:t>.</a:t>
             </a:r>
-            <a:endParaRPr lang="ro-RO" sz="2400" dirty="0" smtClean="0">
-              <a:solidFill>
-                <a:schemeClr val="tx1"/>
-              </a:solidFill>
-              <a:latin typeface="Times New Roman" panose="02020603050405020304" pitchFamily="18" charset="0"/>
-              <a:cs typeface="Times New Roman" panose="02020603050405020304" pitchFamily="18" charset="0"/>
-              <a:sym typeface="Lato Light"/>
-            </a:endParaRPr>
           </a:p>
         </p:txBody>
       </p:sp>
@@ -21803,18 +21670,7 @@
                 <a:cs typeface="Times New Roman" panose="02020603050405020304" pitchFamily="18" charset="0"/>
                 <a:sym typeface="Lato Light"/>
               </a:rPr>
-              <a:t>C</a:t>
-            </a:r>
-            <a:r>
-              <a:rPr lang="ro-RO" sz="2800" dirty="0" smtClean="0">
-                <a:solidFill>
-                  <a:schemeClr val="tx1"/>
-                </a:solidFill>
-                <a:latin typeface="Times New Roman" panose="02020603050405020304" pitchFamily="18" charset="0"/>
-                <a:cs typeface="Times New Roman" panose="02020603050405020304" pitchFamily="18" charset="0"/>
-                <a:sym typeface="Lato Light"/>
-              </a:rPr>
-              <a:t>onfort,	</a:t>
+              <a:t>Confort,	</a:t>
             </a:r>
           </a:p>
           <a:p>
@@ -21881,18 +21737,7 @@
                 <a:cs typeface="Times New Roman" panose="02020603050405020304" pitchFamily="18" charset="0"/>
                 <a:sym typeface="Lato Light"/>
               </a:rPr>
-              <a:t>Software-ul </a:t>
-            </a:r>
-            <a:r>
-              <a:rPr lang="ro-RO" sz="2800" dirty="0" smtClean="0">
-                <a:solidFill>
-                  <a:schemeClr val="tx1"/>
-                </a:solidFill>
-                <a:latin typeface="Times New Roman" panose="02020603050405020304" pitchFamily="18" charset="0"/>
-                <a:cs typeface="Times New Roman" panose="02020603050405020304" pitchFamily="18" charset="0"/>
-                <a:sym typeface="Lato Light"/>
-              </a:rPr>
-              <a:t>de calculator joacă rolul unui agent inteligent.</a:t>
+              <a:t>Software-ul de calculator joacă rolul unui agent inteligent.</a:t>
             </a:r>
           </a:p>
           <a:p>
@@ -22797,14 +22642,6 @@
               </a:rPr>
               <a:t>- Comunicare HTTP cu serverul Java.</a:t>
             </a:r>
-            <a:endParaRPr lang="ro-RO" sz="2800" dirty="0" smtClean="0">
-              <a:solidFill>
-                <a:schemeClr val="tx1"/>
-              </a:solidFill>
-              <a:latin typeface="Times New Roman" panose="02020603050405020304" pitchFamily="18" charset="0"/>
-              <a:cs typeface="Times New Roman" panose="02020603050405020304" pitchFamily="18" charset="0"/>
-              <a:sym typeface="Lato Light"/>
-            </a:endParaRPr>
           </a:p>
         </p:txBody>
       </p:sp>
@@ -23248,8 +23085,49 @@
                 <a:cs typeface="Times New Roman" panose="02020603050405020304" pitchFamily="18" charset="0"/>
                 <a:sym typeface="Lato Light"/>
               </a:rPr>
-              <a:t>dispozitive</a:t>
+              <a:t>dispo</a:t>
             </a:r>
+            <a:r>
+              <a:rPr lang="en-US" sz="3200" dirty="0" smtClean="0">
+                <a:solidFill>
+                  <a:schemeClr val="tx1"/>
+                </a:solidFill>
+                <a:latin typeface="Times New Roman" panose="02020603050405020304" pitchFamily="18" charset="0"/>
+                <a:cs typeface="Times New Roman" panose="02020603050405020304" pitchFamily="18" charset="0"/>
+                <a:sym typeface="Lato Light"/>
+              </a:rPr>
+              <a:t>z</a:t>
+            </a:r>
+            <a:r>
+              <a:rPr lang="ro-RO" sz="3200" dirty="0" smtClean="0">
+                <a:solidFill>
+                  <a:schemeClr val="tx1"/>
+                </a:solidFill>
+                <a:latin typeface="Times New Roman" panose="02020603050405020304" pitchFamily="18" charset="0"/>
+                <a:cs typeface="Times New Roman" panose="02020603050405020304" pitchFamily="18" charset="0"/>
+                <a:sym typeface="Lato Light"/>
+              </a:rPr>
+              <a:t>itive</a:t>
+            </a:r>
+            <a:r>
+              <a:rPr lang="en-US" sz="3200" dirty="0" smtClean="0">
+                <a:solidFill>
+                  <a:schemeClr val="tx1"/>
+                </a:solidFill>
+                <a:latin typeface="Times New Roman" panose="02020603050405020304" pitchFamily="18" charset="0"/>
+                <a:cs typeface="Times New Roman" panose="02020603050405020304" pitchFamily="18" charset="0"/>
+                <a:sym typeface="Lato Light"/>
+              </a:rPr>
+              <a:t>.</a:t>
+            </a:r>
+            <a:endParaRPr lang="ro-RO" sz="3200" dirty="0" smtClean="0">
+              <a:solidFill>
+                <a:schemeClr val="tx1"/>
+              </a:solidFill>
+              <a:latin typeface="Times New Roman" panose="02020603050405020304" pitchFamily="18" charset="0"/>
+              <a:cs typeface="Times New Roman" panose="02020603050405020304" pitchFamily="18" charset="0"/>
+              <a:sym typeface="Lato Light"/>
+            </a:endParaRPr>
           </a:p>
           <a:p>
             <a:pPr marL="342900" marR="0" lvl="0" indent="-342900" algn="l" rtl="0">
@@ -23304,6 +23182,25 @@
               </a:rPr>
               <a:t>personalizat</a:t>
             </a:r>
+            <a:r>
+              <a:rPr lang="en-US" sz="3200" dirty="0" smtClean="0">
+                <a:solidFill>
+                  <a:schemeClr val="tx1"/>
+                </a:solidFill>
+                <a:latin typeface="Times New Roman" panose="02020603050405020304" pitchFamily="18" charset="0"/>
+                <a:cs typeface="Times New Roman" panose="02020603050405020304" pitchFamily="18" charset="0"/>
+                <a:sym typeface="Lato Light"/>
+              </a:rPr>
+              <a:t>.</a:t>
+            </a:r>
+            <a:endParaRPr lang="ro-RO" sz="3200" dirty="0" smtClean="0">
+              <a:solidFill>
+                <a:schemeClr val="tx1"/>
+              </a:solidFill>
+              <a:latin typeface="Times New Roman" panose="02020603050405020304" pitchFamily="18" charset="0"/>
+              <a:cs typeface="Times New Roman" panose="02020603050405020304" pitchFamily="18" charset="0"/>
+              <a:sym typeface="Lato Light"/>
+            </a:endParaRPr>
           </a:p>
           <a:p>
             <a:pPr marL="342900" marR="0" lvl="0" indent="-342900" algn="l" rtl="0">
@@ -23362,6 +23259,17 @@
                 <a:sym typeface="Lato Light"/>
               </a:rPr>
               <a:t>dispozitivele</a:t>
+            </a:r>
+            <a:r>
+              <a:rPr lang="en-US" sz="3200" dirty="0" smtClean="0">
+                <a:solidFill>
+                  <a:schemeClr val="tx1"/>
+                </a:solidFill>
+                <a:latin typeface="Times New Roman" panose="02020603050405020304" pitchFamily="18" charset="0"/>
+                <a:cs typeface="Times New Roman" panose="02020603050405020304" pitchFamily="18" charset="0"/>
+                <a:sym typeface="Lato Light"/>
+              </a:rPr>
+              <a:t>.</a:t>
             </a:r>
             <a:endParaRPr lang="ro-RO" sz="3200" dirty="0">
               <a:solidFill>
@@ -23880,6 +23788,25 @@
               </a:rPr>
               <a:t>Pi</a:t>
             </a:r>
+            <a:r>
+              <a:rPr lang="en-US" sz="3200" dirty="0" smtClean="0">
+                <a:solidFill>
+                  <a:schemeClr val="tx1"/>
+                </a:solidFill>
+                <a:latin typeface="Times New Roman" panose="02020603050405020304" pitchFamily="18" charset="0"/>
+                <a:cs typeface="Times New Roman" panose="02020603050405020304" pitchFamily="18" charset="0"/>
+                <a:sym typeface="Lato Light"/>
+              </a:rPr>
+              <a:t>.</a:t>
+            </a:r>
+            <a:endParaRPr lang="ro-RO" sz="3200" dirty="0" smtClean="0">
+              <a:solidFill>
+                <a:schemeClr val="tx1"/>
+              </a:solidFill>
+              <a:latin typeface="Times New Roman" panose="02020603050405020304" pitchFamily="18" charset="0"/>
+              <a:cs typeface="Times New Roman" panose="02020603050405020304" pitchFamily="18" charset="0"/>
+              <a:sym typeface="Lato Light"/>
+            </a:endParaRPr>
           </a:p>
           <a:p>
             <a:pPr marL="342900" marR="0" lvl="0" indent="-342900" algn="l" rtl="0">
@@ -23921,7 +23848,29 @@
                 <a:cs typeface="Times New Roman" panose="02020603050405020304" pitchFamily="18" charset="0"/>
                 <a:sym typeface="Lato Light"/>
               </a:rPr>
-              <a:t>Dinamicitate în expunerea configurărilor dispozitivelelor</a:t>
+              <a:t>Dinamicitate în expunerea configurărilor </a:t>
+            </a:r>
+            <a:r>
+              <a:rPr lang="ro-RO" sz="3200" dirty="0" smtClean="0">
+                <a:solidFill>
+                  <a:schemeClr val="tx1"/>
+                </a:solidFill>
+                <a:latin typeface="Times New Roman" panose="02020603050405020304" pitchFamily="18" charset="0"/>
+                <a:cs typeface="Times New Roman" panose="02020603050405020304" pitchFamily="18" charset="0"/>
+                <a:sym typeface="Lato Light"/>
+              </a:rPr>
+              <a:t>dispozitivelelor</a:t>
+            </a:r>
+            <a:r>
+              <a:rPr lang="en-US" sz="3200" dirty="0" smtClean="0">
+                <a:solidFill>
+                  <a:schemeClr val="tx1"/>
+                </a:solidFill>
+                <a:latin typeface="Times New Roman" panose="02020603050405020304" pitchFamily="18" charset="0"/>
+                <a:cs typeface="Times New Roman" panose="02020603050405020304" pitchFamily="18" charset="0"/>
+                <a:sym typeface="Lato Light"/>
+              </a:rPr>
+              <a:t>.</a:t>
             </a:r>
             <a:endParaRPr lang="ro-RO" sz="3200" dirty="0" smtClean="0">
               <a:solidFill>

</xml_diff>

<commit_message>
updated doc and presentation
</commit_message>
<xml_diff>
--- a/Documentation/Presentation.pptx
+++ b/Documentation/Presentation.pptx
@@ -28,28 +28,28 @@
   <p:notesSz cx="6858000" cy="9144000"/>
   <p:embeddedFontLst>
     <p:embeddedFont>
-      <p:font typeface="Calibri" panose="020F0502020204030204" pitchFamily="34" charset="0"/>
+      <p:font typeface="Lato Light" panose="020B0604020202020204" charset="0"/>
       <p:regular r:id="rId18"/>
       <p:bold r:id="rId19"/>
       <p:italic r:id="rId20"/>
       <p:boldItalic r:id="rId21"/>
     </p:embeddedFont>
     <p:embeddedFont>
-      <p:font typeface="Montserrat" panose="020B0604020202020204" charset="0"/>
+      <p:font typeface="Calibri" panose="020F0502020204030204" pitchFamily="34" charset="0"/>
       <p:regular r:id="rId22"/>
       <p:bold r:id="rId23"/>
       <p:italic r:id="rId24"/>
       <p:boldItalic r:id="rId25"/>
     </p:embeddedFont>
     <p:embeddedFont>
-      <p:font typeface="Lato Light" panose="020B0604020202020204" charset="0"/>
+      <p:font typeface="Playfair Display" panose="020B0604020202020204" charset="0"/>
       <p:regular r:id="rId26"/>
       <p:bold r:id="rId27"/>
       <p:italic r:id="rId28"/>
       <p:boldItalic r:id="rId29"/>
     </p:embeddedFont>
     <p:embeddedFont>
-      <p:font typeface="Playfair Display" panose="020B0604020202020204" charset="0"/>
+      <p:font typeface="Montserrat" panose="020B0604020202020204" charset="0"/>
       <p:regular r:id="rId30"/>
       <p:bold r:id="rId31"/>
       <p:italic r:id="rId32"/>
@@ -19007,18 +19007,7 @@
                 <a:cs typeface="Times New Roman" panose="02020603050405020304" pitchFamily="18" charset="0"/>
                 <a:sym typeface="Lato Light"/>
               </a:rPr>
-              <a:t>Creșterea numărului de </a:t>
-            </a:r>
-            <a:r>
-              <a:rPr lang="ro-RO" sz="3200" dirty="0" smtClean="0">
-                <a:solidFill>
-                  <a:schemeClr val="tx1"/>
-                </a:solidFill>
-                <a:latin typeface="Times New Roman" panose="02020603050405020304" pitchFamily="18" charset="0"/>
-                <a:cs typeface="Times New Roman" panose="02020603050405020304" pitchFamily="18" charset="0"/>
-                <a:sym typeface="Lato Light"/>
-              </a:rPr>
-              <a:t>dispo</a:t>
+              <a:t>Creșterea numărului de dispo</a:t>
             </a:r>
             <a:r>
               <a:rPr lang="en-US" sz="3200" dirty="0" smtClean="0">
@@ -20815,7 +20804,7 @@
         </p:blipFill>
         <p:spPr>
           <a:xfrm>
-            <a:off x="4021108" y="3271633"/>
+            <a:off x="4299397" y="2982770"/>
             <a:ext cx="3449842" cy="3449842"/>
           </a:xfrm>
           <a:prstGeom prst="rect">
@@ -21029,100 +21018,13 @@
       </p:sp>
       <p:sp>
         <p:nvSpPr>
-          <p:cNvPr id="8" name="Shape 113"/>
-          <p:cNvSpPr txBox="1"/>
-          <p:nvPr/>
-        </p:nvSpPr>
-        <p:spPr>
-          <a:xfrm>
-            <a:off x="660904" y="1549524"/>
-            <a:ext cx="6413132" cy="565818"/>
-          </a:xfrm>
-          <a:prstGeom prst="rect">
-            <a:avLst/>
-          </a:prstGeom>
-          <a:noFill/>
-          <a:ln>
-            <a:noFill/>
-          </a:ln>
-        </p:spPr>
-        <p:txBody>
-          <a:bodyPr spcFirstLastPara="1" wrap="square" lIns="91425" tIns="45700" rIns="91425" bIns="45700" anchor="t" anchorCtr="0">
-            <a:noAutofit/>
-          </a:bodyPr>
-          <a:lstStyle/>
-          <a:p>
-            <a:pPr marL="342900" lvl="0" indent="-342900">
-              <a:buFontTx/>
-              <a:buChar char="-"/>
-            </a:pPr>
-            <a:r>
-              <a:rPr lang="ro-RO" sz="2400" dirty="0" smtClean="0">
-                <a:solidFill>
-                  <a:schemeClr val="tx1"/>
-                </a:solidFill>
-                <a:latin typeface="Times New Roman" panose="02020603050405020304" pitchFamily="18" charset="0"/>
-                <a:cs typeface="Times New Roman" panose="02020603050405020304" pitchFamily="18" charset="0"/>
-                <a:sym typeface="Lato Light"/>
-              </a:rPr>
-              <a:t>Literatura științifico-fantastică - </a:t>
-            </a:r>
-            <a:r>
-              <a:rPr lang="en-US" sz="2400" dirty="0" smtClean="0">
-                <a:solidFill>
-                  <a:schemeClr val="tx1"/>
-                </a:solidFill>
-                <a:latin typeface="Times New Roman" panose="02020603050405020304" pitchFamily="18" charset="0"/>
-                <a:cs typeface="Times New Roman" panose="02020603050405020304" pitchFamily="18" charset="0"/>
-                <a:sym typeface="Lato Light"/>
-              </a:rPr>
-              <a:t>Ray</a:t>
-            </a:r>
-            <a:r>
-              <a:rPr lang="ro-RO" sz="2400" dirty="0" smtClean="0">
-                <a:solidFill>
-                  <a:schemeClr val="tx1"/>
-                </a:solidFill>
-                <a:latin typeface="Times New Roman" panose="02020603050405020304" pitchFamily="18" charset="0"/>
-                <a:cs typeface="Times New Roman" panose="02020603050405020304" pitchFamily="18" charset="0"/>
-                <a:sym typeface="Lato Light"/>
-              </a:rPr>
-              <a:t> </a:t>
-            </a:r>
-            <a:r>
-              <a:rPr lang="en-US" sz="2400" dirty="0" smtClean="0">
-                <a:solidFill>
-                  <a:schemeClr val="tx1"/>
-                </a:solidFill>
-                <a:latin typeface="Times New Roman" panose="02020603050405020304" pitchFamily="18" charset="0"/>
-                <a:cs typeface="Times New Roman" panose="02020603050405020304" pitchFamily="18" charset="0"/>
-                <a:sym typeface="Lato Light"/>
-              </a:rPr>
-              <a:t>Bradbury</a:t>
-            </a:r>
-            <a:r>
-              <a:rPr lang="ro-RO" sz="2400" dirty="0" smtClean="0">
-                <a:solidFill>
-                  <a:schemeClr val="tx1"/>
-                </a:solidFill>
-                <a:latin typeface="Times New Roman" panose="02020603050405020304" pitchFamily="18" charset="0"/>
-                <a:cs typeface="Times New Roman" panose="02020603050405020304" pitchFamily="18" charset="0"/>
-                <a:sym typeface="Lato Light"/>
-              </a:rPr>
-              <a:t>.</a:t>
-            </a:r>
-          </a:p>
-        </p:txBody>
-      </p:sp>
-      <p:sp>
-        <p:nvSpPr>
           <p:cNvPr id="2" name="Cloud Callout 1"/>
           <p:cNvSpPr/>
           <p:nvPr/>
         </p:nvSpPr>
         <p:spPr>
           <a:xfrm>
-            <a:off x="5559268" y="2261945"/>
+            <a:off x="5514000" y="1718799"/>
             <a:ext cx="2397482" cy="1009688"/>
           </a:xfrm>
           <a:prstGeom prst="cloudCallout">
@@ -21163,7 +21065,7 @@
         </p:nvSpPr>
         <p:spPr>
           <a:xfrm>
-            <a:off x="5697534" y="2559212"/>
+            <a:off x="5652266" y="2016066"/>
             <a:ext cx="2120950" cy="369332"/>
           </a:xfrm>
           <a:prstGeom prst="rect">
@@ -21193,7 +21095,7 @@
         </p:nvSpPr>
         <p:spPr>
           <a:xfrm>
-            <a:off x="7956749" y="2773244"/>
+            <a:off x="7911482" y="2484597"/>
             <a:ext cx="2391362" cy="996347"/>
           </a:xfrm>
           <a:prstGeom prst="cloudCallout">
@@ -21234,7 +21136,7 @@
         </p:nvSpPr>
         <p:spPr>
           <a:xfrm>
-            <a:off x="1938276" y="2658272"/>
+            <a:off x="2191773" y="2414121"/>
             <a:ext cx="2680361" cy="861408"/>
           </a:xfrm>
           <a:prstGeom prst="cloudCallout">
@@ -21275,7 +21177,7 @@
         </p:nvSpPr>
         <p:spPr>
           <a:xfrm>
-            <a:off x="8281235" y="2917845"/>
+            <a:off x="8235968" y="2629198"/>
             <a:ext cx="2064191" cy="646331"/>
           </a:xfrm>
           <a:prstGeom prst="rect">
@@ -21322,7 +21224,7 @@
         </p:nvSpPr>
         <p:spPr>
           <a:xfrm>
-            <a:off x="2480179" y="2768614"/>
+            <a:off x="2733676" y="2524463"/>
             <a:ext cx="1750266" cy="646331"/>
           </a:xfrm>
           <a:prstGeom prst="rect">
@@ -21687,8 +21589,63 @@
                 <a:cs typeface="Times New Roman" panose="02020603050405020304" pitchFamily="18" charset="0"/>
                 <a:sym typeface="Lato Light"/>
               </a:rPr>
-              <a:t>Securitate,</a:t>
+              <a:t>Securitate</a:t>
             </a:r>
+            <a:r>
+              <a:rPr lang="ro-RO" sz="2800" dirty="0" smtClean="0">
+                <a:solidFill>
+                  <a:schemeClr val="tx1"/>
+                </a:solidFill>
+                <a:latin typeface="Times New Roman" panose="02020603050405020304" pitchFamily="18" charset="0"/>
+                <a:cs typeface="Times New Roman" panose="02020603050405020304" pitchFamily="18" charset="0"/>
+                <a:sym typeface="Lato Light"/>
+              </a:rPr>
+              <a:t>,</a:t>
+            </a:r>
+            <a:endParaRPr lang="en-US" sz="2800" dirty="0">
+              <a:solidFill>
+                <a:schemeClr val="tx1"/>
+              </a:solidFill>
+              <a:latin typeface="Times New Roman" panose="02020603050405020304" pitchFamily="18" charset="0"/>
+              <a:cs typeface="Times New Roman" panose="02020603050405020304" pitchFamily="18" charset="0"/>
+              <a:sym typeface="Lato Light"/>
+            </a:endParaRPr>
+          </a:p>
+          <a:p>
+            <a:pPr marL="342900" lvl="0" indent="-342900">
+              <a:buFontTx/>
+              <a:buChar char="-"/>
+            </a:pPr>
+            <a:r>
+              <a:rPr lang="en-US" sz="2800" dirty="0" smtClean="0">
+                <a:solidFill>
+                  <a:schemeClr val="tx1"/>
+                </a:solidFill>
+                <a:latin typeface="Times New Roman" panose="02020603050405020304" pitchFamily="18" charset="0"/>
+                <a:cs typeface="Times New Roman" panose="02020603050405020304" pitchFamily="18" charset="0"/>
+                <a:sym typeface="Lato Light"/>
+              </a:rPr>
+              <a:t>U</a:t>
+            </a:r>
+            <a:r>
+              <a:rPr lang="ro-RO" sz="2800" dirty="0" smtClean="0">
+                <a:solidFill>
+                  <a:schemeClr val="tx1"/>
+                </a:solidFill>
+                <a:latin typeface="Times New Roman" panose="02020603050405020304" pitchFamily="18" charset="0"/>
+                <a:cs typeface="Times New Roman" panose="02020603050405020304" pitchFamily="18" charset="0"/>
+                <a:sym typeface="Lato Light"/>
+              </a:rPr>
+              <a:t>șurință în utilizare,</a:t>
+            </a:r>
+            <a:endParaRPr lang="ro-RO" sz="2800" dirty="0" smtClean="0">
+              <a:solidFill>
+                <a:schemeClr val="tx1"/>
+              </a:solidFill>
+              <a:latin typeface="Times New Roman" panose="02020603050405020304" pitchFamily="18" charset="0"/>
+              <a:cs typeface="Times New Roman" panose="02020603050405020304" pitchFamily="18" charset="0"/>
+              <a:sym typeface="Lato Light"/>
+            </a:endParaRPr>
           </a:p>
           <a:p>
             <a:pPr marL="342900" lvl="0" indent="-342900">
@@ -23074,18 +23031,7 @@
                 <a:cs typeface="Times New Roman" panose="02020603050405020304" pitchFamily="18" charset="0"/>
                 <a:sym typeface="Lato Light"/>
               </a:rPr>
-              <a:t>Manager de </a:t>
-            </a:r>
-            <a:r>
-              <a:rPr lang="ro-RO" sz="3200" dirty="0" smtClean="0">
-                <a:solidFill>
-                  <a:schemeClr val="tx1"/>
-                </a:solidFill>
-                <a:latin typeface="Times New Roman" panose="02020603050405020304" pitchFamily="18" charset="0"/>
-                <a:cs typeface="Times New Roman" panose="02020603050405020304" pitchFamily="18" charset="0"/>
-                <a:sym typeface="Lato Light"/>
-              </a:rPr>
-              <a:t>dispo</a:t>
+              <a:t>Manager de dispo</a:t>
             </a:r>
             <a:r>
               <a:rPr lang="en-US" sz="3200" dirty="0" smtClean="0">
@@ -23169,7 +23115,18 @@
                 <a:cs typeface="Times New Roman" panose="02020603050405020304" pitchFamily="18" charset="0"/>
                 <a:sym typeface="Lato Light"/>
               </a:rPr>
-              <a:t>Protocol de comunicare </a:t>
+              <a:t>Protocol de </a:t>
+            </a:r>
+            <a:r>
+              <a:rPr lang="ro-RO" sz="3200" dirty="0" smtClean="0">
+                <a:solidFill>
+                  <a:schemeClr val="tx1"/>
+                </a:solidFill>
+                <a:latin typeface="Times New Roman" panose="02020603050405020304" pitchFamily="18" charset="0"/>
+                <a:cs typeface="Times New Roman" panose="02020603050405020304" pitchFamily="18" charset="0"/>
+                <a:sym typeface="Lato Light"/>
+              </a:rPr>
+              <a:t>comunicație </a:t>
             </a:r>
             <a:r>
               <a:rPr lang="ro-RO" sz="3200" dirty="0" smtClean="0">
@@ -23236,7 +23193,7 @@
                 <a:cs typeface="Times New Roman" panose="02020603050405020304" pitchFamily="18" charset="0"/>
                 <a:sym typeface="Lato Light"/>
               </a:rPr>
-              <a:t>Comunicare </a:t>
+              <a:t>Securitate în comunicarea </a:t>
             </a:r>
             <a:r>
               <a:rPr lang="ro-RO" sz="3200" dirty="0">
@@ -23247,7 +23204,7 @@
                 <a:cs typeface="Times New Roman" panose="02020603050405020304" pitchFamily="18" charset="0"/>
                 <a:sym typeface="Lato Light"/>
               </a:rPr>
-              <a:t>securizată cu </a:t>
+              <a:t>cu </a:t>
             </a:r>
             <a:r>
               <a:rPr lang="ro-RO" sz="3200" dirty="0" smtClean="0">
@@ -23775,18 +23732,7 @@
                 <a:cs typeface="Times New Roman" panose="02020603050405020304" pitchFamily="18" charset="0"/>
                 <a:sym typeface="Lato Light"/>
               </a:rPr>
-              <a:t>Raspberry </a:t>
-            </a:r>
-            <a:r>
-              <a:rPr lang="ro-RO" sz="3200" dirty="0" smtClean="0">
-                <a:solidFill>
-                  <a:schemeClr val="tx1"/>
-                </a:solidFill>
-                <a:latin typeface="Times New Roman" panose="02020603050405020304" pitchFamily="18" charset="0"/>
-                <a:cs typeface="Times New Roman" panose="02020603050405020304" pitchFamily="18" charset="0"/>
-                <a:sym typeface="Lato Light"/>
-              </a:rPr>
-              <a:t>Pi</a:t>
+              <a:t>Raspberry Pi</a:t>
             </a:r>
             <a:r>
               <a:rPr lang="en-US" sz="3200" dirty="0" smtClean="0">
@@ -23848,18 +23794,7 @@
                 <a:cs typeface="Times New Roman" panose="02020603050405020304" pitchFamily="18" charset="0"/>
                 <a:sym typeface="Lato Light"/>
               </a:rPr>
-              <a:t>Dinamicitate în expunerea configurărilor </a:t>
-            </a:r>
-            <a:r>
-              <a:rPr lang="ro-RO" sz="3200" dirty="0" smtClean="0">
-                <a:solidFill>
-                  <a:schemeClr val="tx1"/>
-                </a:solidFill>
-                <a:latin typeface="Times New Roman" panose="02020603050405020304" pitchFamily="18" charset="0"/>
-                <a:cs typeface="Times New Roman" panose="02020603050405020304" pitchFamily="18" charset="0"/>
-                <a:sym typeface="Lato Light"/>
-              </a:rPr>
-              <a:t>dispozitivelelor</a:t>
+              <a:t>Dinamicitate în expunerea configurărilor dispozitivelelor</a:t>
             </a:r>
             <a:r>
               <a:rPr lang="en-US" sz="3200" dirty="0" smtClean="0">

</xml_diff>

<commit_message>
updated presentation + fixed bug
</commit_message>
<xml_diff>
--- a/Documentation/Presentation.pptx
+++ b/Documentation/Presentation.pptx
@@ -28,7 +28,7 @@
   <p:notesSz cx="6858000" cy="9144000"/>
   <p:embeddedFontLst>
     <p:embeddedFont>
-      <p:font typeface="Lato Light" panose="020B0604020202020204" charset="0"/>
+      <p:font typeface="Montserrat" panose="020B0604020202020204" charset="0"/>
       <p:regular r:id="rId18"/>
       <p:bold r:id="rId19"/>
       <p:italic r:id="rId20"/>
@@ -42,14 +42,14 @@
       <p:boldItalic r:id="rId25"/>
     </p:embeddedFont>
     <p:embeddedFont>
-      <p:font typeface="Playfair Display" panose="020B0604020202020204" charset="0"/>
+      <p:font typeface="Lato Light" panose="020B0604020202020204" charset="0"/>
       <p:regular r:id="rId26"/>
       <p:bold r:id="rId27"/>
       <p:italic r:id="rId28"/>
       <p:boldItalic r:id="rId29"/>
     </p:embeddedFont>
     <p:embeddedFont>
-      <p:font typeface="Montserrat" panose="020B0604020202020204" charset="0"/>
+      <p:font typeface="Playfair Display" panose="020B0604020202020204" charset="0"/>
       <p:regular r:id="rId30"/>
       <p:bold r:id="rId31"/>
       <p:italic r:id="rId32"/>
@@ -21196,7 +21196,35 @@
                 <a:latin typeface="Times New Roman" panose="02020603050405020304" pitchFamily="18" charset="0"/>
                 <a:cs typeface="Times New Roman" panose="02020603050405020304" pitchFamily="18" charset="0"/>
               </a:rPr>
-              <a:t>Oare am lăsat apa aprinsă în baie</a:t>
+              <a:t>Oare am lăsat apa </a:t>
+            </a:r>
+            <a:r>
+              <a:rPr lang="en-US" sz="1800" dirty="0" err="1" smtClean="0">
+                <a:latin typeface="Times New Roman" panose="02020603050405020304" pitchFamily="18" charset="0"/>
+                <a:cs typeface="Times New Roman" panose="02020603050405020304" pitchFamily="18" charset="0"/>
+              </a:rPr>
+              <a:t>deschis</a:t>
+            </a:r>
+            <a:r>
+              <a:rPr lang="ro-RO" sz="1800" dirty="0">
+                <a:latin typeface="Times New Roman" panose="02020603050405020304" pitchFamily="18" charset="0"/>
+                <a:cs typeface="Times New Roman" panose="02020603050405020304" pitchFamily="18" charset="0"/>
+              </a:rPr>
+              <a:t>ă</a:t>
+            </a:r>
+            <a:r>
+              <a:rPr lang="ro-RO" sz="1800" dirty="0" smtClean="0">
+                <a:latin typeface="Times New Roman" panose="02020603050405020304" pitchFamily="18" charset="0"/>
+                <a:cs typeface="Times New Roman" panose="02020603050405020304" pitchFamily="18" charset="0"/>
+              </a:rPr>
+              <a:t> </a:t>
+            </a:r>
+            <a:r>
+              <a:rPr lang="ro-RO" sz="1800" dirty="0">
+                <a:latin typeface="Times New Roman" panose="02020603050405020304" pitchFamily="18" charset="0"/>
+                <a:cs typeface="Times New Roman" panose="02020603050405020304" pitchFamily="18" charset="0"/>
+              </a:rPr>
+              <a:t>în baie</a:t>
             </a:r>
             <a:r>
               <a:rPr lang="ro-RO" sz="1800" dirty="0" smtClean="0">
@@ -21589,18 +21617,7 @@
                 <a:cs typeface="Times New Roman" panose="02020603050405020304" pitchFamily="18" charset="0"/>
                 <a:sym typeface="Lato Light"/>
               </a:rPr>
-              <a:t>Securitate</a:t>
-            </a:r>
-            <a:r>
-              <a:rPr lang="ro-RO" sz="2800" dirty="0" smtClean="0">
-                <a:solidFill>
-                  <a:schemeClr val="tx1"/>
-                </a:solidFill>
-                <a:latin typeface="Times New Roman" panose="02020603050405020304" pitchFamily="18" charset="0"/>
-                <a:cs typeface="Times New Roman" panose="02020603050405020304" pitchFamily="18" charset="0"/>
-                <a:sym typeface="Lato Light"/>
-              </a:rPr>
-              <a:t>,</a:t>
+              <a:t>Securitate,</a:t>
             </a:r>
             <a:endParaRPr lang="en-US" sz="2800" dirty="0">
               <a:solidFill>
@@ -21638,14 +21655,6 @@
               </a:rPr>
               <a:t>șurință în utilizare,</a:t>
             </a:r>
-            <a:endParaRPr lang="ro-RO" sz="2800" dirty="0" smtClean="0">
-              <a:solidFill>
-                <a:schemeClr val="tx1"/>
-              </a:solidFill>
-              <a:latin typeface="Times New Roman" panose="02020603050405020304" pitchFamily="18" charset="0"/>
-              <a:cs typeface="Times New Roman" panose="02020603050405020304" pitchFamily="18" charset="0"/>
-              <a:sym typeface="Lato Light"/>
-            </a:endParaRPr>
           </a:p>
           <a:p>
             <a:pPr marL="342900" lvl="0" indent="-342900">
@@ -23115,29 +23124,7 @@
                 <a:cs typeface="Times New Roman" panose="02020603050405020304" pitchFamily="18" charset="0"/>
                 <a:sym typeface="Lato Light"/>
               </a:rPr>
-              <a:t>Protocol de </a:t>
-            </a:r>
-            <a:r>
-              <a:rPr lang="ro-RO" sz="3200" dirty="0" smtClean="0">
-                <a:solidFill>
-                  <a:schemeClr val="tx1"/>
-                </a:solidFill>
-                <a:latin typeface="Times New Roman" panose="02020603050405020304" pitchFamily="18" charset="0"/>
-                <a:cs typeface="Times New Roman" panose="02020603050405020304" pitchFamily="18" charset="0"/>
-                <a:sym typeface="Lato Light"/>
-              </a:rPr>
-              <a:t>comunicație </a:t>
-            </a:r>
-            <a:r>
-              <a:rPr lang="ro-RO" sz="3200" dirty="0" smtClean="0">
-                <a:solidFill>
-                  <a:schemeClr val="tx1"/>
-                </a:solidFill>
-                <a:latin typeface="Times New Roman" panose="02020603050405020304" pitchFamily="18" charset="0"/>
-                <a:cs typeface="Times New Roman" panose="02020603050405020304" pitchFamily="18" charset="0"/>
-                <a:sym typeface="Lato Light"/>
-              </a:rPr>
-              <a:t>personalizat</a:t>
+              <a:t>Protocol de comunicație personalizat</a:t>
             </a:r>
             <a:r>
               <a:rPr lang="en-US" sz="3200" dirty="0" smtClean="0">

</xml_diff>